<commit_message>
fix images for sample app
</commit_message>
<xml_diff>
--- a/sample-app/images/images_raw.pptx
+++ b/sample-app/images/images_raw.pptx
@@ -9369,7 +9369,7 @@
             <a:noFill/>
             <a:extLst>
               <a:ext uri="{909E8E84-426E-40dd-AFC4-6F175D3DCCD1}">
-                <a14:hiddenFill xmlns="" xmlns:a14="http://schemas.microsoft.com/office/drawing/2010/main">
+                <a14:hiddenFill xmlns:a14="http://schemas.microsoft.com/office/drawing/2010/main" xmlns="">
                   <a:solidFill>
                     <a:srgbClr val="FFFFFF"/>
                   </a:solidFill>
@@ -9626,7 +9626,7 @@
             <a:noFill/>
             <a:extLst>
               <a:ext uri="{909E8E84-426E-40dd-AFC4-6F175D3DCCD1}">
-                <a14:hiddenFill xmlns:a14="http://schemas.microsoft.com/office/drawing/2010/main" xmlns="">
+                <a14:hiddenFill xmlns="" xmlns:a14="http://schemas.microsoft.com/office/drawing/2010/main">
                   <a:solidFill>
                     <a:srgbClr val="FFFFFF"/>
                   </a:solidFill>
@@ -18094,7 +18094,7 @@
             <a:noFill/>
             <a:extLst>
               <a:ext uri="{909E8E84-426E-40dd-AFC4-6F175D3DCCD1}">
-                <a14:hiddenFill xmlns="" xmlns:a14="http://schemas.microsoft.com/office/drawing/2010/main">
+                <a14:hiddenFill xmlns:a14="http://schemas.microsoft.com/office/drawing/2010/main" xmlns="">
                   <a:solidFill>
                     <a:srgbClr val="FFFFFF"/>
                   </a:solidFill>
@@ -18351,7 +18351,7 @@
             <a:noFill/>
             <a:extLst>
               <a:ext uri="{909E8E84-426E-40dd-AFC4-6F175D3DCCD1}">
-                <a14:hiddenFill xmlns:a14="http://schemas.microsoft.com/office/drawing/2010/main" xmlns="">
+                <a14:hiddenFill xmlns="" xmlns:a14="http://schemas.microsoft.com/office/drawing/2010/main">
                   <a:solidFill>
                     <a:srgbClr val="FFFFFF"/>
                   </a:solidFill>
@@ -22051,7 +22051,7 @@
             <a:noFill/>
             <a:extLst>
               <a:ext uri="{909E8E84-426E-40dd-AFC4-6F175D3DCCD1}">
-                <a14:hiddenFill xmlns:a14="http://schemas.microsoft.com/office/drawing/2010/main" xmlns="">
+                <a14:hiddenFill xmlns="" xmlns:a14="http://schemas.microsoft.com/office/drawing/2010/main">
                   <a:solidFill>
                     <a:srgbClr val="FFFFFF"/>
                   </a:solidFill>
@@ -22298,7 +22298,7 @@
             <a:noFill/>
             <a:extLst>
               <a:ext uri="{909E8E84-426E-40dd-AFC4-6F175D3DCCD1}">
-                <a14:hiddenFill xmlns="" xmlns:a14="http://schemas.microsoft.com/office/drawing/2010/main">
+                <a14:hiddenFill xmlns:a14="http://schemas.microsoft.com/office/drawing/2010/main" xmlns="">
                   <a:solidFill>
                     <a:srgbClr val="FFFFFF"/>
                   </a:solidFill>
@@ -50065,6 +50065,103 @@
           </p:cxnSp>
         </p:grpSp>
       </p:grpSp>
+      <p:sp>
+        <p:nvSpPr>
+          <p:cNvPr id="99" name="Oval 98">
+            <a:extLst>
+              <a:ext uri="{FF2B5EF4-FFF2-40B4-BE49-F238E27FC236}">
+                <a16:creationId xmlns:a16="http://schemas.microsoft.com/office/drawing/2014/main" id="{12E9F1E7-3920-40AB-9554-9704196F5811}"/>
+              </a:ext>
+            </a:extLst>
+          </p:cNvPr>
+          <p:cNvSpPr/>
+          <p:nvPr/>
+        </p:nvSpPr>
+        <p:spPr bwMode="gray">
+          <a:xfrm>
+            <a:off x="8649907" y="486722"/>
+            <a:ext cx="711209" cy="691567"/>
+          </a:xfrm>
+          <a:prstGeom prst="ellipse">
+            <a:avLst/>
+          </a:prstGeom>
+          <a:solidFill>
+            <a:schemeClr val="bg1"/>
+          </a:solidFill>
+          <a:ln w="12700" algn="ctr">
+            <a:solidFill>
+              <a:schemeClr val="tx1"/>
+            </a:solidFill>
+            <a:miter lim="800000"/>
+            <a:headEnd/>
+            <a:tailEnd/>
+          </a:ln>
+        </p:spPr>
+        <p:txBody>
+          <a:bodyPr lIns="90000" tIns="72000" rIns="90000" bIns="72000" rtlCol="0" anchor="ctr"/>
+          <a:lstStyle/>
+          <a:p>
+            <a:pPr marR="0" algn="ctr" defTabSz="914400" eaLnBrk="1" fontAlgn="base" latinLnBrk="0" hangingPunct="1">
+              <a:lnSpc>
+                <a:spcPct val="100000"/>
+              </a:lnSpc>
+              <a:spcBef>
+                <a:spcPct val="50000"/>
+              </a:spcBef>
+              <a:spcAft>
+                <a:spcPct val="0"/>
+              </a:spcAft>
+              <a:buClr>
+                <a:srgbClr val="F0AB00"/>
+              </a:buClr>
+              <a:buSzPct val="80000"/>
+              <a:tabLst/>
+            </a:pPr>
+            <a:endParaRPr kumimoji="0" lang="en-US" sz="1800" b="0" i="0" u="none" strike="noStrike" kern="0" cap="none" spc="0" normalizeH="0" baseline="0" noProof="0" dirty="0" err="1">
+              <a:ln>
+                <a:noFill/>
+              </a:ln>
+              <a:effectLst/>
+              <a:uLnTx/>
+              <a:uFillTx/>
+              <a:ea typeface="Arial Unicode MS" pitchFamily="34" charset="-128"/>
+              <a:cs typeface="Arial Unicode MS" pitchFamily="34" charset="-128"/>
+            </a:endParaRPr>
+          </a:p>
+        </p:txBody>
+      </p:sp>
+      <p:pic>
+        <p:nvPicPr>
+          <p:cNvPr id="100" name="Picture 99">
+            <a:extLst>
+              <a:ext uri="{FF2B5EF4-FFF2-40B4-BE49-F238E27FC236}">
+                <a16:creationId xmlns:a16="http://schemas.microsoft.com/office/drawing/2014/main" id="{C7DD2D42-8A32-47D0-9B36-3842B52C0595}"/>
+              </a:ext>
+            </a:extLst>
+          </p:cNvPr>
+          <p:cNvPicPr>
+            <a:picLocks noChangeAspect="1"/>
+          </p:cNvPicPr>
+          <p:nvPr/>
+        </p:nvPicPr>
+        <p:blipFill rotWithShape="1">
+          <a:blip r:embed="rId14"/>
+          <a:srcRect l="22882" t="-6962" r="23394" b="-3363"/>
+          <a:stretch/>
+        </p:blipFill>
+        <p:spPr>
+          <a:xfrm>
+            <a:off x="8759062" y="583196"/>
+            <a:ext cx="512851" cy="498617"/>
+          </a:xfrm>
+          <a:prstGeom prst="rect">
+            <a:avLst/>
+          </a:prstGeom>
+          <a:ln>
+            <a:noFill/>
+          </a:ln>
+        </p:spPr>
+      </p:pic>
     </p:spTree>
     <p:extLst>
       <p:ext uri="{BB962C8B-B14F-4D97-AF65-F5344CB8AC3E}">

</xml_diff>